<commit_message>
Live trigger distance setting
</commit_message>
<xml_diff>
--- a/doc/IIDX_Pico_Manual.pptx
+++ b/doc/IIDX_Pico_Manual.pptx
@@ -7,10 +7,10 @@
     <p:sldMasterId id="2147483652" r:id="rId3"/>
   </p:sldMasterIdLst>
   <p:notesMasterIdLst>
-    <p:notesMasterId r:id="rId17"/>
+    <p:notesMasterId r:id="rId19"/>
   </p:notesMasterIdLst>
   <p:handoutMasterIdLst>
-    <p:handoutMasterId r:id="rId18"/>
+    <p:handoutMasterId r:id="rId20"/>
   </p:handoutMasterIdLst>
   <p:sldIdLst>
     <p:sldId id="271" r:id="rId4"/>
@@ -20,12 +20,14 @@
     <p:sldId id="263" r:id="rId8"/>
     <p:sldId id="260" r:id="rId9"/>
     <p:sldId id="264" r:id="rId10"/>
-    <p:sldId id="265" r:id="rId11"/>
-    <p:sldId id="266" r:id="rId12"/>
-    <p:sldId id="267" r:id="rId13"/>
-    <p:sldId id="268" r:id="rId14"/>
-    <p:sldId id="269" r:id="rId15"/>
-    <p:sldId id="270" r:id="rId16"/>
+    <p:sldId id="272" r:id="rId11"/>
+    <p:sldId id="265" r:id="rId12"/>
+    <p:sldId id="266" r:id="rId13"/>
+    <p:sldId id="267" r:id="rId14"/>
+    <p:sldId id="268" r:id="rId15"/>
+    <p:sldId id="269" r:id="rId16"/>
+    <p:sldId id="270" r:id="rId17"/>
+    <p:sldId id="273" r:id="rId18"/>
   </p:sldIdLst>
   <p:sldSz cx="12192000" cy="6858000"/>
   <p:notesSz cx="10234613" cy="7104063"/>
@@ -226,7 +228,7 @@
           <a:p>
             <a:fld id="{99D69C7F-8110-406B-A63E-81EB2EBDFE06}" type="datetimeFigureOut">
               <a:rPr lang="zh-CN" altLang="en-US" smtClean="0"/>
-              <a:t>2025/6/20</a:t>
+              <a:t>2025/9/27</a:t>
             </a:fld>
             <a:endParaRPr lang="zh-CN" altLang="en-US"/>
           </a:p>
@@ -404,7 +406,7 @@
           <a:p>
             <a:fld id="{002F3B7A-C25F-4CE1-8FEE-39C6D6ACD16A}" type="datetimeFigureOut">
               <a:rPr lang="zh-CN" altLang="en-US" smtClean="0"/>
-              <a:t>2025/6/20</a:t>
+              <a:t>2025/9/27</a:t>
             </a:fld>
             <a:endParaRPr lang="zh-CN" altLang="en-US"/>
           </a:p>
@@ -1870,8 +1872,8 @@
           <a:chExt cx="0" cy="0"/>
         </a:xfrm>
       </p:grpSpPr>
-      <mc:AlternateContent xmlns:mc="http://schemas.openxmlformats.org/markup-compatibility/2006">
-        <mc:Choice xmlns:pslz="http://schemas.microsoft.com/office/powerpoint/2016/slidezoom" Requires="pslz">
+      <mc:AlternateContent xmlns:mc="http://schemas.openxmlformats.org/markup-compatibility/2006" xmlns:pslz="http://schemas.microsoft.com/office/powerpoint/2016/slidezoom">
+        <mc:Choice Requires="pslz">
           <p:graphicFrame>
             <p:nvGraphicFramePr>
               <p:cNvPr id="3" name="幻灯片缩放定位 2">
@@ -1928,7 +1930,7 @@
             </a:graphic>
           </p:graphicFrame>
         </mc:Choice>
-        <mc:Fallback>
+        <mc:Fallback xmlns="">
           <p:pic>
             <p:nvPicPr>
               <p:cNvPr id="3" name="幻灯片缩放定位 2">
@@ -1945,7 +1947,7 @@
               <p:nvPr/>
             </p:nvPicPr>
             <p:blipFill>
-              <a:blip r:embed="rId2"/>
+              <a:blip r:embed="rId4"/>
               <a:stretch>
                 <a:fillRect/>
               </a:stretch>
@@ -1967,8 +1969,8 @@
           </p:pic>
         </mc:Fallback>
       </mc:AlternateContent>
-      <mc:AlternateContent xmlns:mc="http://schemas.openxmlformats.org/markup-compatibility/2006">
-        <mc:Choice xmlns:pslz="http://schemas.microsoft.com/office/powerpoint/2016/slidezoom" Requires="pslz">
+      <mc:AlternateContent xmlns:mc="http://schemas.openxmlformats.org/markup-compatibility/2006" xmlns:pslz="http://schemas.microsoft.com/office/powerpoint/2016/slidezoom">
+        <mc:Choice Requires="pslz">
           <p:graphicFrame>
             <p:nvGraphicFramePr>
               <p:cNvPr id="5" name="幻灯片缩放定位 4">
@@ -1999,7 +2001,7 @@
                   <pslz:sldZmObj sldId="265" cId="3381834881">
                     <pslz:zmPr id="{F635E814-9518-4FDD-8C1F-F2B8429CB0D4}" returnToParent="0" transitionDur="1000">
                       <p166:blipFill xmlns:p166="http://schemas.microsoft.com/office/powerpoint/2016/6/main">
-                        <a:blip r:embed="rId4"/>
+                        <a:blip r:embed="rId5"/>
                         <a:stretch>
                           <a:fillRect/>
                         </a:stretch>
@@ -2025,11 +2027,11 @@
             </a:graphic>
           </p:graphicFrame>
         </mc:Choice>
-        <mc:Fallback>
+        <mc:Fallback xmlns="">
           <p:pic>
             <p:nvPicPr>
               <p:cNvPr id="5" name="幻灯片缩放定位 4">
-                <a:hlinkClick r:id="rId5" action="ppaction://hlinksldjump"/>
+                <a:hlinkClick r:id="rId6" action="ppaction://hlinksldjump"/>
                 <a:extLst>
                   <a:ext uri="{FF2B5EF4-FFF2-40B4-BE49-F238E27FC236}">
                     <a16:creationId xmlns:a16="http://schemas.microsoft.com/office/drawing/2014/main" id="{05D57391-D162-A119-F88A-5D80CD00788A}"/>
@@ -2042,7 +2044,7 @@
               <p:nvPr/>
             </p:nvPicPr>
             <p:blipFill>
-              <a:blip r:embed="rId4"/>
+              <a:blip r:embed="rId7"/>
               <a:stretch>
                 <a:fillRect/>
               </a:stretch>
@@ -2079,7 +2081,7 @@
           <p:nvPr/>
         </p:nvPicPr>
         <p:blipFill>
-          <a:blip r:embed="rId6">
+          <a:blip r:embed="rId8">
             <a:extLst>
               <a:ext uri="{28A0092B-C50C-407E-A947-70E740481C1C}">
                 <a14:useLocalDpi xmlns:a14="http://schemas.microsoft.com/office/drawing/2010/main" val="0"/>
@@ -2126,7 +2128,7 @@
           <p:nvPr/>
         </p:nvPicPr>
         <p:blipFill>
-          <a:blip r:embed="rId6">
+          <a:blip r:embed="rId8">
             <a:extLst>
               <a:ext uri="{28A0092B-C50C-407E-A947-70E740481C1C}">
                 <a14:useLocalDpi xmlns:a14="http://schemas.microsoft.com/office/drawing/2010/main" val="0"/>
@@ -2187,6 +2189,598 @@
         <p:cNvPr id="1" name="">
           <a:extLst>
             <a:ext uri="{FF2B5EF4-FFF2-40B4-BE49-F238E27FC236}">
+              <a16:creationId xmlns:a16="http://schemas.microsoft.com/office/drawing/2014/main" id="{61F1D812-5BA9-0BB6-A2CB-8144F2050635}"/>
+            </a:ext>
+          </a:extLst>
+        </p:cNvPr>
+        <p:cNvGrpSpPr/>
+        <p:nvPr/>
+      </p:nvGrpSpPr>
+      <p:grpSpPr>
+        <a:xfrm>
+          <a:off x="0" y="0"/>
+          <a:ext cx="0" cy="0"/>
+          <a:chOff x="0" y="0"/>
+          <a:chExt cx="0" cy="0"/>
+        </a:xfrm>
+      </p:grpSpPr>
+      <p:sp>
+        <p:nvSpPr>
+          <p:cNvPr id="3" name="标题 2">
+            <a:extLst>
+              <a:ext uri="{FF2B5EF4-FFF2-40B4-BE49-F238E27FC236}">
+                <a16:creationId xmlns:a16="http://schemas.microsoft.com/office/drawing/2014/main" id="{C95C3CBE-D830-48AE-C36C-371E973ABD59}"/>
+              </a:ext>
+            </a:extLst>
+          </p:cNvPr>
+          <p:cNvSpPr>
+            <a:spLocks noGrp="1"/>
+          </p:cNvSpPr>
+          <p:nvPr>
+            <p:ph type="title"/>
+          </p:nvPr>
+        </p:nvSpPr>
+        <p:spPr/>
+        <p:txBody>
+          <a:bodyPr/>
+          <a:lstStyle/>
+          <a:p>
+            <a:r>
+              <a:rPr lang="zh-CN" altLang="en-US" dirty="0"/>
+              <a:t>上电</a:t>
+            </a:r>
+          </a:p>
+        </p:txBody>
+      </p:sp>
+      <p:sp>
+        <p:nvSpPr>
+          <p:cNvPr id="4" name="矩形: 圆角 3">
+            <a:extLst>
+              <a:ext uri="{FF2B5EF4-FFF2-40B4-BE49-F238E27FC236}">
+                <a16:creationId xmlns:a16="http://schemas.microsoft.com/office/drawing/2014/main" id="{5185EF17-572E-6637-7D80-31307BF54A05}"/>
+              </a:ext>
+            </a:extLst>
+          </p:cNvPr>
+          <p:cNvSpPr/>
+          <p:nvPr/>
+        </p:nvSpPr>
+        <p:spPr>
+          <a:xfrm>
+            <a:off x="9928225" y="1540931"/>
+            <a:ext cx="190500" cy="203200"/>
+          </a:xfrm>
+          <a:prstGeom prst="roundRect">
+            <a:avLst/>
+          </a:prstGeom>
+          <a:solidFill>
+            <a:srgbClr val="FF0000">
+              <a:alpha val="50196"/>
+            </a:srgbClr>
+          </a:solidFill>
+          <a:ln>
+            <a:noFill/>
+          </a:ln>
+        </p:spPr>
+        <p:style>
+          <a:lnRef idx="2">
+            <a:schemeClr val="accent1">
+              <a:shade val="50000"/>
+            </a:schemeClr>
+          </a:lnRef>
+          <a:fillRef idx="1">
+            <a:schemeClr val="accent1"/>
+          </a:fillRef>
+          <a:effectRef idx="0">
+            <a:schemeClr val="accent1"/>
+          </a:effectRef>
+          <a:fontRef idx="minor">
+            <a:schemeClr val="lt1"/>
+          </a:fontRef>
+        </p:style>
+        <p:txBody>
+          <a:bodyPr rtlCol="0" anchor="ctr"/>
+          <a:lstStyle/>
+          <a:p>
+            <a:pPr algn="ctr"/>
+            <a:endParaRPr lang="zh-CN" altLang="en-US"/>
+          </a:p>
+        </p:txBody>
+      </p:sp>
+      <p:sp>
+        <p:nvSpPr>
+          <p:cNvPr id="7" name="矩形: 圆角 6">
+            <a:extLst>
+              <a:ext uri="{FF2B5EF4-FFF2-40B4-BE49-F238E27FC236}">
+                <a16:creationId xmlns:a16="http://schemas.microsoft.com/office/drawing/2014/main" id="{00BF303D-C3A7-A6FE-A8B7-83BDA49410F8}"/>
+              </a:ext>
+            </a:extLst>
+          </p:cNvPr>
+          <p:cNvSpPr/>
+          <p:nvPr/>
+        </p:nvSpPr>
+        <p:spPr>
+          <a:xfrm>
+            <a:off x="10202862" y="1540931"/>
+            <a:ext cx="190500" cy="203200"/>
+          </a:xfrm>
+          <a:prstGeom prst="roundRect">
+            <a:avLst/>
+          </a:prstGeom>
+          <a:solidFill>
+            <a:srgbClr val="FF0000">
+              <a:alpha val="50196"/>
+            </a:srgbClr>
+          </a:solidFill>
+          <a:ln>
+            <a:noFill/>
+          </a:ln>
+        </p:spPr>
+        <p:style>
+          <a:lnRef idx="2">
+            <a:schemeClr val="accent1">
+              <a:shade val="50000"/>
+            </a:schemeClr>
+          </a:lnRef>
+          <a:fillRef idx="1">
+            <a:schemeClr val="accent1"/>
+          </a:fillRef>
+          <a:effectRef idx="0">
+            <a:schemeClr val="accent1"/>
+          </a:effectRef>
+          <a:fontRef idx="minor">
+            <a:schemeClr val="lt1"/>
+          </a:fontRef>
+        </p:style>
+        <p:txBody>
+          <a:bodyPr rtlCol="0" anchor="ctr"/>
+          <a:lstStyle/>
+          <a:p>
+            <a:pPr algn="ctr"/>
+            <a:endParaRPr lang="zh-CN" altLang="en-US"/>
+          </a:p>
+        </p:txBody>
+      </p:sp>
+      <p:sp>
+        <p:nvSpPr>
+          <p:cNvPr id="21" name="文本框 20">
+            <a:extLst>
+              <a:ext uri="{FF2B5EF4-FFF2-40B4-BE49-F238E27FC236}">
+                <a16:creationId xmlns:a16="http://schemas.microsoft.com/office/drawing/2014/main" id="{D0208DEA-27EC-BDAB-AE6F-6042613ECF68}"/>
+              </a:ext>
+            </a:extLst>
+          </p:cNvPr>
+          <p:cNvSpPr txBox="1"/>
+          <p:nvPr/>
+        </p:nvSpPr>
+        <p:spPr>
+          <a:xfrm>
+            <a:off x="8712200" y="627757"/>
+            <a:ext cx="1012216" cy="303536"/>
+          </a:xfrm>
+          <a:prstGeom prst="rect">
+            <a:avLst/>
+          </a:prstGeom>
+          <a:noFill/>
+        </p:spPr>
+        <p:txBody>
+          <a:bodyPr wrap="square" lIns="36000" tIns="36000" rIns="36000" bIns="36000" rtlCol="0">
+            <a:spAutoFit/>
+          </a:bodyPr>
+          <a:lstStyle/>
+          <a:p>
+            <a:pPr algn="ctr">
+              <a:lnSpc>
+                <a:spcPts val="1800"/>
+              </a:lnSpc>
+            </a:pPr>
+            <a:r>
+              <a:rPr lang="zh-CN" altLang="en-US" sz="1600" b="1" dirty="0">
+                <a:solidFill>
+                  <a:schemeClr val="accent1">
+                    <a:lumMod val="75000"/>
+                  </a:schemeClr>
+                </a:solidFill>
+              </a:rPr>
+              <a:t>普通设备</a:t>
+            </a:r>
+          </a:p>
+        </p:txBody>
+      </p:sp>
+      <p:cxnSp>
+        <p:nvCxnSpPr>
+          <p:cNvPr id="28" name="连接符: 肘形 27">
+            <a:extLst>
+              <a:ext uri="{FF2B5EF4-FFF2-40B4-BE49-F238E27FC236}">
+                <a16:creationId xmlns:a16="http://schemas.microsoft.com/office/drawing/2014/main" id="{1B444566-DD0C-E75E-2CB9-9CD5E45AD36D}"/>
+              </a:ext>
+            </a:extLst>
+          </p:cNvPr>
+          <p:cNvCxnSpPr>
+            <a:cxnSpLocks/>
+            <a:stCxn id="21" idx="3"/>
+            <a:endCxn id="4" idx="0"/>
+          </p:cNvCxnSpPr>
+          <p:nvPr/>
+        </p:nvCxnSpPr>
+        <p:spPr>
+          <a:xfrm>
+            <a:off x="9724416" y="779525"/>
+            <a:ext cx="299059" cy="761406"/>
+          </a:xfrm>
+          <a:prstGeom prst="bentConnector2">
+            <a:avLst/>
+          </a:prstGeom>
+          <a:ln w="28575">
+            <a:solidFill>
+              <a:srgbClr val="FF0000"/>
+            </a:solidFill>
+            <a:prstDash val="sysDot"/>
+          </a:ln>
+        </p:spPr>
+        <p:style>
+          <a:lnRef idx="1">
+            <a:schemeClr val="accent1"/>
+          </a:lnRef>
+          <a:fillRef idx="0">
+            <a:schemeClr val="accent1"/>
+          </a:fillRef>
+          <a:effectRef idx="0">
+            <a:schemeClr val="accent1"/>
+          </a:effectRef>
+          <a:fontRef idx="minor">
+            <a:schemeClr val="tx1"/>
+          </a:fontRef>
+        </p:style>
+      </p:cxnSp>
+      <p:cxnSp>
+        <p:nvCxnSpPr>
+          <p:cNvPr id="29" name="连接符: 肘形 28">
+            <a:extLst>
+              <a:ext uri="{FF2B5EF4-FFF2-40B4-BE49-F238E27FC236}">
+                <a16:creationId xmlns:a16="http://schemas.microsoft.com/office/drawing/2014/main" id="{C6F08998-9D1D-7156-08CC-54F15038B613}"/>
+              </a:ext>
+            </a:extLst>
+          </p:cNvPr>
+          <p:cNvCxnSpPr>
+            <a:cxnSpLocks/>
+            <a:stCxn id="4" idx="2"/>
+            <a:endCxn id="32" idx="1"/>
+          </p:cNvCxnSpPr>
+          <p:nvPr/>
+        </p:nvCxnSpPr>
+        <p:spPr>
+          <a:xfrm rot="16200000" flipH="1">
+            <a:off x="10397845" y="1369760"/>
+            <a:ext cx="135002" cy="883743"/>
+          </a:xfrm>
+          <a:prstGeom prst="bentConnector2">
+            <a:avLst/>
+          </a:prstGeom>
+          <a:ln w="28575">
+            <a:solidFill>
+              <a:srgbClr val="FF0000"/>
+            </a:solidFill>
+            <a:prstDash val="sysDot"/>
+          </a:ln>
+        </p:spPr>
+        <p:style>
+          <a:lnRef idx="1">
+            <a:schemeClr val="accent1"/>
+          </a:lnRef>
+          <a:fillRef idx="0">
+            <a:schemeClr val="accent1"/>
+          </a:fillRef>
+          <a:effectRef idx="0">
+            <a:schemeClr val="accent1"/>
+          </a:effectRef>
+          <a:fontRef idx="minor">
+            <a:schemeClr val="tx1"/>
+          </a:fontRef>
+        </p:style>
+      </p:cxnSp>
+      <p:sp>
+        <p:nvSpPr>
+          <p:cNvPr id="32" name="文本框 31">
+            <a:extLst>
+              <a:ext uri="{FF2B5EF4-FFF2-40B4-BE49-F238E27FC236}">
+                <a16:creationId xmlns:a16="http://schemas.microsoft.com/office/drawing/2014/main" id="{EF22CD16-C4EC-CB5E-5C31-BC94328A0821}"/>
+              </a:ext>
+            </a:extLst>
+          </p:cNvPr>
+          <p:cNvSpPr txBox="1"/>
+          <p:nvPr/>
+        </p:nvSpPr>
+        <p:spPr>
+          <a:xfrm>
+            <a:off x="10907218" y="1727365"/>
+            <a:ext cx="1004489" cy="303536"/>
+          </a:xfrm>
+          <a:prstGeom prst="rect">
+            <a:avLst/>
+          </a:prstGeom>
+          <a:noFill/>
+        </p:spPr>
+        <p:txBody>
+          <a:bodyPr wrap="square" lIns="36000" tIns="36000" rIns="36000" bIns="36000" rtlCol="0">
+            <a:spAutoFit/>
+          </a:bodyPr>
+          <a:lstStyle/>
+          <a:p>
+            <a:pPr algn="ctr">
+              <a:lnSpc>
+                <a:spcPts val="1800"/>
+              </a:lnSpc>
+            </a:pPr>
+            <a:r>
+              <a:rPr lang="zh-CN" altLang="en-US" sz="1600" b="1" dirty="0">
+                <a:solidFill>
+                  <a:schemeClr val="accent1">
+                    <a:lumMod val="75000"/>
+                  </a:schemeClr>
+                </a:solidFill>
+              </a:rPr>
+              <a:t>固件更新</a:t>
+            </a:r>
+          </a:p>
+        </p:txBody>
+      </p:sp>
+      <p:sp>
+        <p:nvSpPr>
+          <p:cNvPr id="43" name="文本框 42">
+            <a:extLst>
+              <a:ext uri="{FF2B5EF4-FFF2-40B4-BE49-F238E27FC236}">
+                <a16:creationId xmlns:a16="http://schemas.microsoft.com/office/drawing/2014/main" id="{FE497A5C-E648-8EF0-1D63-03B5D08B21FB}"/>
+              </a:ext>
+            </a:extLst>
+          </p:cNvPr>
+          <p:cNvSpPr txBox="1"/>
+          <p:nvPr/>
+        </p:nvSpPr>
+        <p:spPr>
+          <a:xfrm>
+            <a:off x="10507110" y="627757"/>
+            <a:ext cx="1404597" cy="303536"/>
+          </a:xfrm>
+          <a:prstGeom prst="rect">
+            <a:avLst/>
+          </a:prstGeom>
+          <a:noFill/>
+        </p:spPr>
+        <p:txBody>
+          <a:bodyPr wrap="square" lIns="36000" tIns="36000" rIns="36000" bIns="36000" rtlCol="0">
+            <a:spAutoFit/>
+          </a:bodyPr>
+          <a:lstStyle/>
+          <a:p>
+            <a:pPr algn="ctr">
+              <a:lnSpc>
+                <a:spcPts val="1800"/>
+              </a:lnSpc>
+            </a:pPr>
+            <a:r>
+              <a:rPr lang="en-US" altLang="zh-CN" sz="1600" b="1" dirty="0">
+                <a:solidFill>
+                  <a:schemeClr val="accent1">
+                    <a:lumMod val="75000"/>
+                  </a:schemeClr>
+                </a:solidFill>
+              </a:rPr>
+              <a:t>KONAMI </a:t>
+            </a:r>
+            <a:r>
+              <a:rPr lang="zh-CN" altLang="en-US" sz="1600" b="1" dirty="0">
+                <a:solidFill>
+                  <a:schemeClr val="accent1">
+                    <a:lumMod val="75000"/>
+                  </a:schemeClr>
+                </a:solidFill>
+              </a:rPr>
+              <a:t>设备</a:t>
+            </a:r>
+          </a:p>
+        </p:txBody>
+      </p:sp>
+      <p:cxnSp>
+        <p:nvCxnSpPr>
+          <p:cNvPr id="44" name="连接符: 肘形 43">
+            <a:extLst>
+              <a:ext uri="{FF2B5EF4-FFF2-40B4-BE49-F238E27FC236}">
+                <a16:creationId xmlns:a16="http://schemas.microsoft.com/office/drawing/2014/main" id="{5C669BF4-6EAA-6C08-7BEB-8A19558E53C9}"/>
+              </a:ext>
+            </a:extLst>
+          </p:cNvPr>
+          <p:cNvCxnSpPr>
+            <a:cxnSpLocks/>
+            <a:stCxn id="43" idx="1"/>
+            <a:endCxn id="7" idx="0"/>
+          </p:cNvCxnSpPr>
+          <p:nvPr/>
+        </p:nvCxnSpPr>
+        <p:spPr>
+          <a:xfrm rot="10800000" flipV="1">
+            <a:off x="10298112" y="779525"/>
+            <a:ext cx="208998" cy="761406"/>
+          </a:xfrm>
+          <a:prstGeom prst="bentConnector2">
+            <a:avLst/>
+          </a:prstGeom>
+          <a:ln w="28575">
+            <a:solidFill>
+              <a:srgbClr val="FF0000"/>
+            </a:solidFill>
+            <a:prstDash val="sysDot"/>
+          </a:ln>
+        </p:spPr>
+        <p:style>
+          <a:lnRef idx="1">
+            <a:schemeClr val="accent1"/>
+          </a:lnRef>
+          <a:fillRef idx="0">
+            <a:schemeClr val="accent1"/>
+          </a:fillRef>
+          <a:effectRef idx="0">
+            <a:schemeClr val="accent1"/>
+          </a:effectRef>
+          <a:fontRef idx="minor">
+            <a:schemeClr val="tx1"/>
+          </a:fontRef>
+        </p:style>
+      </p:cxnSp>
+      <p:cxnSp>
+        <p:nvCxnSpPr>
+          <p:cNvPr id="50" name="连接符: 肘形 49">
+            <a:extLst>
+              <a:ext uri="{FF2B5EF4-FFF2-40B4-BE49-F238E27FC236}">
+                <a16:creationId xmlns:a16="http://schemas.microsoft.com/office/drawing/2014/main" id="{474A83A9-BC29-D99F-6F99-AD99E702EC46}"/>
+              </a:ext>
+            </a:extLst>
+          </p:cNvPr>
+          <p:cNvCxnSpPr>
+            <a:cxnSpLocks/>
+            <a:stCxn id="7" idx="2"/>
+            <a:endCxn id="32" idx="1"/>
+          </p:cNvCxnSpPr>
+          <p:nvPr/>
+        </p:nvCxnSpPr>
+        <p:spPr>
+          <a:xfrm rot="16200000" flipH="1">
+            <a:off x="10535164" y="1507079"/>
+            <a:ext cx="135002" cy="609106"/>
+          </a:xfrm>
+          <a:prstGeom prst="bentConnector2">
+            <a:avLst/>
+          </a:prstGeom>
+          <a:ln w="28575">
+            <a:solidFill>
+              <a:srgbClr val="FF0000"/>
+            </a:solidFill>
+            <a:prstDash val="sysDot"/>
+          </a:ln>
+        </p:spPr>
+        <p:style>
+          <a:lnRef idx="1">
+            <a:schemeClr val="accent1"/>
+          </a:lnRef>
+          <a:fillRef idx="0">
+            <a:schemeClr val="accent1"/>
+          </a:fillRef>
+          <a:effectRef idx="0">
+            <a:schemeClr val="accent1"/>
+          </a:effectRef>
+          <a:fontRef idx="minor">
+            <a:schemeClr val="tx1"/>
+          </a:fontRef>
+        </p:style>
+      </p:cxnSp>
+      <p:sp>
+        <p:nvSpPr>
+          <p:cNvPr id="55" name="文本框 54">
+            <a:extLst>
+              <a:ext uri="{FF2B5EF4-FFF2-40B4-BE49-F238E27FC236}">
+                <a16:creationId xmlns:a16="http://schemas.microsoft.com/office/drawing/2014/main" id="{DC4DDEC2-D731-819F-716B-4505E2236D05}"/>
+              </a:ext>
+            </a:extLst>
+          </p:cNvPr>
+          <p:cNvSpPr txBox="1"/>
+          <p:nvPr/>
+        </p:nvSpPr>
+        <p:spPr>
+          <a:xfrm>
+            <a:off x="8768596" y="244470"/>
+            <a:ext cx="2626526" cy="239415"/>
+          </a:xfrm>
+          <a:prstGeom prst="rect">
+            <a:avLst/>
+          </a:prstGeom>
+          <a:solidFill>
+            <a:schemeClr val="bg1">
+              <a:lumMod val="85000"/>
+            </a:schemeClr>
+          </a:solidFill>
+          <a:ln w="9525">
+            <a:solidFill>
+              <a:srgbClr val="0070C0"/>
+            </a:solidFill>
+            <a:prstDash val="sysDot"/>
+          </a:ln>
+          <a:effectLst/>
+        </p:spPr>
+        <p:txBody>
+          <a:bodyPr wrap="square" lIns="54000" tIns="36000" rIns="36000" bIns="36000" rtlCol="0">
+            <a:spAutoFit/>
+          </a:bodyPr>
+          <a:lstStyle/>
+          <a:p>
+            <a:pPr>
+              <a:lnSpc>
+                <a:spcPts val="1300"/>
+              </a:lnSpc>
+            </a:pPr>
+            <a:r>
+              <a:rPr lang="zh-CN" altLang="en-US" sz="1200" b="1" dirty="0">
+                <a:solidFill>
+                  <a:schemeClr val="tx1">
+                    <a:lumMod val="75000"/>
+                    <a:lumOff val="25000"/>
+                  </a:schemeClr>
+                </a:solidFill>
+              </a:rPr>
+              <a:t>设备模式会存储在 </a:t>
+            </a:r>
+            <a:r>
+              <a:rPr lang="en-US" altLang="zh-CN" sz="1200" b="1" dirty="0">
+                <a:solidFill>
+                  <a:schemeClr val="tx1">
+                    <a:lumMod val="75000"/>
+                    <a:lumOff val="25000"/>
+                  </a:schemeClr>
+                </a:solidFill>
+              </a:rPr>
+              <a:t>flash </a:t>
+            </a:r>
+            <a:r>
+              <a:rPr lang="zh-CN" altLang="en-US" sz="1200" b="1" dirty="0">
+                <a:solidFill>
+                  <a:schemeClr val="tx1">
+                    <a:lumMod val="75000"/>
+                    <a:lumOff val="25000"/>
+                  </a:schemeClr>
+                </a:solidFill>
+              </a:rPr>
+              <a:t>里。</a:t>
+            </a:r>
+          </a:p>
+        </p:txBody>
+      </p:sp>
+    </p:spTree>
+    <p:extLst>
+      <p:ext uri="{BB962C8B-B14F-4D97-AF65-F5344CB8AC3E}">
+        <p14:creationId xmlns:p14="http://schemas.microsoft.com/office/powerpoint/2010/main" val="3530045677"/>
+      </p:ext>
+    </p:extLst>
+  </p:cSld>
+  <p:clrMapOvr>
+    <a:masterClrMapping/>
+  </p:clrMapOvr>
+</p:sld>
+</file>
+
+<file path=ppt/slides/slide11.xml><?xml version="1.0" encoding="utf-8"?>
+<p:sld xmlns:a="http://schemas.openxmlformats.org/drawingml/2006/main" xmlns:r="http://schemas.openxmlformats.org/officeDocument/2006/relationships" xmlns:p="http://schemas.openxmlformats.org/presentationml/2006/main">
+  <p:cSld>
+    <p:bg>
+      <p:bgPr>
+        <a:solidFill>
+          <a:srgbClr val="FFFFE5"/>
+        </a:solidFill>
+        <a:effectLst/>
+      </p:bgPr>
+    </p:bg>
+    <p:spTree>
+      <p:nvGrpSpPr>
+        <p:cNvPr id="1" name="">
+          <a:extLst>
+            <a:ext uri="{FF2B5EF4-FFF2-40B4-BE49-F238E27FC236}">
               <a16:creationId xmlns:a16="http://schemas.microsoft.com/office/drawing/2014/main" id="{616FBAF8-CADB-5CA2-58AD-D882D60CA59F}"/>
             </a:ext>
           </a:extLst>
@@ -2709,13 +3303,35 @@
           <a:lstStyle/>
           <a:p>
             <a:pPr algn="ctr"/>
-            <a:endParaRPr lang="zh-CN" altLang="en-US" sz="1300" b="1" dirty="0">
-              <a:solidFill>
-                <a:schemeClr val="accent4">
-                  <a:lumMod val="75000"/>
-                </a:schemeClr>
-              </a:solidFill>
-            </a:endParaRPr>
+            <a:r>
+              <a:rPr lang="zh-CN" altLang="en-US" sz="1300" b="1" dirty="0">
+                <a:solidFill>
+                  <a:schemeClr val="accent4">
+                    <a:lumMod val="75000"/>
+                  </a:schemeClr>
+                </a:solidFill>
+              </a:rPr>
+              <a:t>恢复</a:t>
+            </a:r>
+            <a:br>
+              <a:rPr lang="en-US" altLang="zh-CN" sz="1300" b="1" dirty="0">
+                <a:solidFill>
+                  <a:schemeClr val="accent4">
+                    <a:lumMod val="75000"/>
+                  </a:schemeClr>
+                </a:solidFill>
+              </a:rPr>
+            </a:br>
+            <a:r>
+              <a:rPr lang="zh-CN" altLang="en-US" sz="1300" b="1" dirty="0">
+                <a:solidFill>
+                  <a:schemeClr val="accent4">
+                    <a:lumMod val="75000"/>
+                  </a:schemeClr>
+                </a:solidFill>
+              </a:rPr>
+              <a:t>行程</a:t>
+            </a:r>
           </a:p>
         </p:txBody>
       </p:sp>
@@ -2942,13 +3558,35 @@
           <a:lstStyle/>
           <a:p>
             <a:pPr algn="ctr"/>
-            <a:endParaRPr lang="zh-CN" altLang="en-US" sz="1300" b="1" dirty="0">
-              <a:solidFill>
-                <a:schemeClr val="accent4">
-                  <a:lumMod val="75000"/>
-                </a:schemeClr>
-              </a:solidFill>
-            </a:endParaRPr>
+            <a:r>
+              <a:rPr lang="zh-CN" altLang="en-US" sz="1300" b="1" dirty="0">
+                <a:solidFill>
+                  <a:schemeClr val="accent4">
+                    <a:lumMod val="75000"/>
+                  </a:schemeClr>
+                </a:solidFill>
+              </a:rPr>
+              <a:t>触发</a:t>
+            </a:r>
+            <a:br>
+              <a:rPr lang="en-US" altLang="zh-CN" sz="1300" b="1" dirty="0">
+                <a:solidFill>
+                  <a:schemeClr val="accent4">
+                    <a:lumMod val="75000"/>
+                  </a:schemeClr>
+                </a:solidFill>
+              </a:rPr>
+            </a:br>
+            <a:r>
+              <a:rPr lang="zh-CN" altLang="en-US" sz="1300" b="1" dirty="0">
+                <a:solidFill>
+                  <a:schemeClr val="accent4">
+                    <a:lumMod val="75000"/>
+                  </a:schemeClr>
+                </a:solidFill>
+              </a:rPr>
+              <a:t>行程</a:t>
+            </a:r>
           </a:p>
         </p:txBody>
       </p:sp>
@@ -3968,7 +4606,7 @@
 </p:sld>
 </file>
 
-<file path=ppt/slides/slide11.xml><?xml version="1.0" encoding="utf-8"?>
+<file path=ppt/slides/slide12.xml><?xml version="1.0" encoding="utf-8"?>
 <p:sld xmlns:a="http://schemas.openxmlformats.org/drawingml/2006/main" xmlns:r="http://schemas.openxmlformats.org/officeDocument/2006/relationships" xmlns:p="http://schemas.openxmlformats.org/presentationml/2006/main">
   <p:cSld>
     <p:spTree>
@@ -5481,7 +6119,7 @@
 </p:sld>
 </file>
 
-<file path=ppt/slides/slide12.xml><?xml version="1.0" encoding="utf-8"?>
+<file path=ppt/slides/slide13.xml><?xml version="1.0" encoding="utf-8"?>
 <p:sld xmlns:a="http://schemas.openxmlformats.org/drawingml/2006/main" xmlns:r="http://schemas.openxmlformats.org/officeDocument/2006/relationships" xmlns:p="http://schemas.openxmlformats.org/presentationml/2006/main">
   <p:cSld>
     <p:spTree>
@@ -7858,7 +8496,7 @@
 </p:sld>
 </file>
 
-<file path=ppt/slides/slide13.xml><?xml version="1.0" encoding="utf-8"?>
+<file path=ppt/slides/slide14.xml><?xml version="1.0" encoding="utf-8"?>
 <p:sld xmlns:a="http://schemas.openxmlformats.org/drawingml/2006/main" xmlns:r="http://schemas.openxmlformats.org/officeDocument/2006/relationships" xmlns:p="http://schemas.openxmlformats.org/presentationml/2006/main">
   <p:cSld>
     <p:spTree>
@@ -7903,10 +8541,17 @@
           <a:lstStyle/>
           <a:p>
             <a:r>
+              <a:rPr lang="zh-CN" altLang="en-US" dirty="0"/>
+              <a:t>按键</a:t>
+            </a:r>
+            <a:r>
               <a:rPr lang="en-US" altLang="zh-CN" dirty="0"/>
-              <a:t>Key On/Off Light</a:t>
-            </a:r>
-            <a:endParaRPr lang="zh-CN" altLang="en-US" dirty="0"/>
+              <a:t> On/Off </a:t>
+            </a:r>
+            <a:r>
+              <a:rPr lang="zh-CN" altLang="en-US" dirty="0"/>
+              <a:t>灯光设置</a:t>
+            </a:r>
           </a:p>
         </p:txBody>
       </p:sp>
@@ -8774,6 +9419,411 @@
 </p:sld>
 </file>
 
+<file path=ppt/slides/slide15.xml><?xml version="1.0" encoding="utf-8"?>
+<p:sld xmlns:a="http://schemas.openxmlformats.org/drawingml/2006/main" xmlns:r="http://schemas.openxmlformats.org/officeDocument/2006/relationships" xmlns:p="http://schemas.openxmlformats.org/presentationml/2006/main">
+  <p:cSld>
+    <p:spTree>
+      <p:nvGrpSpPr>
+        <p:cNvPr id="1" name="">
+          <a:extLst>
+            <a:ext uri="{FF2B5EF4-FFF2-40B4-BE49-F238E27FC236}">
+              <a16:creationId xmlns:a16="http://schemas.microsoft.com/office/drawing/2014/main" id="{4F51F77B-6586-BB37-D858-382A9EAC587F}"/>
+            </a:ext>
+          </a:extLst>
+        </p:cNvPr>
+        <p:cNvGrpSpPr/>
+        <p:nvPr/>
+      </p:nvGrpSpPr>
+      <p:grpSpPr>
+        <a:xfrm>
+          <a:off x="0" y="0"/>
+          <a:ext cx="0" cy="0"/>
+          <a:chOff x="0" y="0"/>
+          <a:chExt cx="0" cy="0"/>
+        </a:xfrm>
+      </p:grpSpPr>
+      <p:sp>
+        <p:nvSpPr>
+          <p:cNvPr id="7" name="标题 6">
+            <a:extLst>
+              <a:ext uri="{FF2B5EF4-FFF2-40B4-BE49-F238E27FC236}">
+                <a16:creationId xmlns:a16="http://schemas.microsoft.com/office/drawing/2014/main" id="{0472C003-F19B-28D3-9B1B-E3BE57758975}"/>
+              </a:ext>
+            </a:extLst>
+          </p:cNvPr>
+          <p:cNvSpPr>
+            <a:spLocks noGrp="1"/>
+          </p:cNvSpPr>
+          <p:nvPr>
+            <p:ph type="title"/>
+          </p:nvPr>
+        </p:nvSpPr>
+        <p:spPr/>
+        <p:txBody>
+          <a:bodyPr/>
+          <a:lstStyle/>
+          <a:p>
+            <a:r>
+              <a:rPr lang="zh-CN" altLang="en-US" dirty="0"/>
+              <a:t>霍尔按键触发和恢复行程设置</a:t>
+            </a:r>
+          </a:p>
+        </p:txBody>
+      </p:sp>
+      <p:grpSp>
+        <p:nvGrpSpPr>
+          <p:cNvPr id="17" name="组合 16">
+            <a:extLst>
+              <a:ext uri="{FF2B5EF4-FFF2-40B4-BE49-F238E27FC236}">
+                <a16:creationId xmlns:a16="http://schemas.microsoft.com/office/drawing/2014/main" id="{A92080C4-9D02-B08D-1717-6DD73379B5EE}"/>
+              </a:ext>
+            </a:extLst>
+          </p:cNvPr>
+          <p:cNvGrpSpPr/>
+          <p:nvPr/>
+        </p:nvGrpSpPr>
+        <p:grpSpPr>
+          <a:xfrm>
+            <a:off x="4068963" y="1943978"/>
+            <a:ext cx="2780362" cy="1243731"/>
+            <a:chOff x="2477438" y="1454900"/>
+            <a:chExt cx="2780362" cy="1243731"/>
+          </a:xfrm>
+        </p:grpSpPr>
+        <p:pic>
+          <p:nvPicPr>
+            <p:cNvPr id="4" name="图片 3">
+              <a:extLst>
+                <a:ext uri="{FF2B5EF4-FFF2-40B4-BE49-F238E27FC236}">
+                  <a16:creationId xmlns:a16="http://schemas.microsoft.com/office/drawing/2014/main" id="{44500EA1-F2C7-F9C3-F1A7-9918A33AD1DC}"/>
+                </a:ext>
+              </a:extLst>
+            </p:cNvPr>
+            <p:cNvPicPr>
+              <a:picLocks noChangeAspect="1"/>
+            </p:cNvPicPr>
+            <p:nvPr/>
+          </p:nvPicPr>
+          <p:blipFill>
+            <a:blip r:embed="rId2"/>
+            <a:stretch>
+              <a:fillRect/>
+            </a:stretch>
+          </p:blipFill>
+          <p:spPr>
+            <a:xfrm>
+              <a:off x="2477438" y="1454900"/>
+              <a:ext cx="1283680" cy="1243731"/>
+            </a:xfrm>
+            <a:prstGeom prst="rect">
+              <a:avLst/>
+            </a:prstGeom>
+          </p:spPr>
+        </p:pic>
+        <p:sp>
+          <p:nvSpPr>
+            <p:cNvPr id="8" name="文本框 7">
+              <a:extLst>
+                <a:ext uri="{FF2B5EF4-FFF2-40B4-BE49-F238E27FC236}">
+                  <a16:creationId xmlns:a16="http://schemas.microsoft.com/office/drawing/2014/main" id="{45A22DF8-887E-CCD4-783B-2C6445C41377}"/>
+                </a:ext>
+              </a:extLst>
+            </p:cNvPr>
+            <p:cNvSpPr txBox="1"/>
+            <p:nvPr/>
+          </p:nvSpPr>
+          <p:spPr>
+            <a:xfrm>
+              <a:off x="3974120" y="1934711"/>
+              <a:ext cx="1283680" cy="338554"/>
+            </a:xfrm>
+            <a:prstGeom prst="rect">
+              <a:avLst/>
+            </a:prstGeom>
+            <a:noFill/>
+          </p:spPr>
+          <p:txBody>
+            <a:bodyPr wrap="square" lIns="36000" rIns="36000" rtlCol="0">
+              <a:spAutoFit/>
+            </a:bodyPr>
+            <a:lstStyle/>
+            <a:p>
+              <a:r>
+                <a:rPr lang="zh-CN" altLang="en-US" sz="1600" dirty="0"/>
+                <a:t>设置行程</a:t>
+              </a:r>
+              <a:endParaRPr lang="zh-CN" altLang="en-US" sz="1600" b="1" dirty="0"/>
+            </a:p>
+          </p:txBody>
+        </p:sp>
+      </p:grpSp>
+      <p:graphicFrame>
+        <p:nvGraphicFramePr>
+          <p:cNvPr id="13" name="对象 12">
+            <a:extLst>
+              <a:ext uri="{FF2B5EF4-FFF2-40B4-BE49-F238E27FC236}">
+                <a16:creationId xmlns:a16="http://schemas.microsoft.com/office/drawing/2014/main" id="{680B4369-3810-F04C-C507-D33AC7CDBF10}"/>
+              </a:ext>
+            </a:extLst>
+          </p:cNvPr>
+          <p:cNvGraphicFramePr>
+            <a:graphicFrameLocks noChangeAspect="1"/>
+          </p:cNvGraphicFramePr>
+          <p:nvPr/>
+        </p:nvGraphicFramePr>
+        <p:xfrm>
+          <a:off x="4175192" y="3706760"/>
+          <a:ext cx="1025030" cy="915371"/>
+        </p:xfrm>
+        <a:graphic>
+          <a:graphicData uri="http://schemas.openxmlformats.org/presentationml/2006/ole">
+            <mc:AlternateContent xmlns:mc="http://schemas.openxmlformats.org/markup-compatibility/2006">
+              <mc:Choice xmlns:v="urn:schemas-microsoft-com:vml" Requires="v">
+                <p:oleObj r:id="rId3" imgW="1750685" imgH="1563257" progId="">
+                  <p:embed/>
+                </p:oleObj>
+              </mc:Choice>
+              <mc:Fallback>
+                <p:oleObj r:id="rId3" imgW="1750685" imgH="1563257" progId="">
+                  <p:embed/>
+                  <p:pic>
+                    <p:nvPicPr>
+                      <p:cNvPr id="13" name="对象 12">
+                        <a:extLst>
+                          <a:ext uri="{FF2B5EF4-FFF2-40B4-BE49-F238E27FC236}">
+                            <a16:creationId xmlns:a16="http://schemas.microsoft.com/office/drawing/2014/main" id="{347E18AB-89B5-FD16-0D34-12ABE4ECFE56}"/>
+                          </a:ext>
+                        </a:extLst>
+                      </p:cNvPr>
+                      <p:cNvPicPr/>
+                      <p:nvPr/>
+                    </p:nvPicPr>
+                    <p:blipFill>
+                      <a:blip r:embed="rId4"/>
+                      <a:stretch>
+                        <a:fillRect/>
+                      </a:stretch>
+                    </p:blipFill>
+                    <p:spPr>
+                      <a:xfrm>
+                        <a:off x="4175192" y="3706760"/>
+                        <a:ext cx="1025030" cy="915371"/>
+                      </a:xfrm>
+                      <a:prstGeom prst="rect">
+                        <a:avLst/>
+                      </a:prstGeom>
+                    </p:spPr>
+                  </p:pic>
+                </p:oleObj>
+              </mc:Fallback>
+            </mc:AlternateContent>
+          </a:graphicData>
+        </a:graphic>
+      </p:graphicFrame>
+      <p:sp>
+        <p:nvSpPr>
+          <p:cNvPr id="16" name="箭头: 右 15">
+            <a:extLst>
+              <a:ext uri="{FF2B5EF4-FFF2-40B4-BE49-F238E27FC236}">
+                <a16:creationId xmlns:a16="http://schemas.microsoft.com/office/drawing/2014/main" id="{25F15138-7CA4-6D53-DA4F-E30EF655DC69}"/>
+              </a:ext>
+            </a:extLst>
+          </p:cNvPr>
+          <p:cNvSpPr/>
+          <p:nvPr/>
+        </p:nvSpPr>
+        <p:spPr>
+          <a:xfrm>
+            <a:off x="1731839" y="2827709"/>
+            <a:ext cx="747623" cy="720000"/>
+          </a:xfrm>
+          <a:prstGeom prst="rightArrow">
+            <a:avLst/>
+          </a:prstGeom>
+        </p:spPr>
+        <p:style>
+          <a:lnRef idx="2">
+            <a:schemeClr val="accent1"/>
+          </a:lnRef>
+          <a:fillRef idx="1">
+            <a:schemeClr val="lt1"/>
+          </a:fillRef>
+          <a:effectRef idx="0">
+            <a:schemeClr val="accent1"/>
+          </a:effectRef>
+          <a:fontRef idx="minor">
+            <a:schemeClr val="dk1"/>
+          </a:fontRef>
+        </p:style>
+        <p:txBody>
+          <a:bodyPr rtlCol="0" anchor="ctr"/>
+          <a:lstStyle/>
+          <a:p>
+            <a:pPr algn="ctr"/>
+            <a:endParaRPr lang="zh-CN" altLang="en-US" dirty="0"/>
+          </a:p>
+        </p:txBody>
+      </p:sp>
+      <p:sp>
+        <p:nvSpPr>
+          <p:cNvPr id="34" name="文本框 33">
+            <a:extLst>
+              <a:ext uri="{FF2B5EF4-FFF2-40B4-BE49-F238E27FC236}">
+                <a16:creationId xmlns:a16="http://schemas.microsoft.com/office/drawing/2014/main" id="{27238835-2D3F-DDF5-DCB1-0A6238134543}"/>
+              </a:ext>
+            </a:extLst>
+          </p:cNvPr>
+          <p:cNvSpPr txBox="1"/>
+          <p:nvPr/>
+        </p:nvSpPr>
+        <p:spPr>
+          <a:xfrm>
+            <a:off x="5459144" y="3994007"/>
+            <a:ext cx="2206172" cy="338554"/>
+          </a:xfrm>
+          <a:prstGeom prst="rect">
+            <a:avLst/>
+          </a:prstGeom>
+          <a:noFill/>
+        </p:spPr>
+        <p:txBody>
+          <a:bodyPr wrap="square" rtlCol="0">
+            <a:spAutoFit/>
+          </a:bodyPr>
+          <a:lstStyle/>
+          <a:p>
+            <a:r>
+              <a:rPr lang="zh-CN" altLang="en-US" sz="1600" dirty="0"/>
+              <a:t>选择需要应用的键</a:t>
+            </a:r>
+            <a:endParaRPr lang="en-US" altLang="zh-CN" sz="1600" b="1" dirty="0"/>
+          </a:p>
+        </p:txBody>
+      </p:sp>
+      <p:pic>
+        <p:nvPicPr>
+          <p:cNvPr id="38" name="图片 37">
+            <a:extLst>
+              <a:ext uri="{FF2B5EF4-FFF2-40B4-BE49-F238E27FC236}">
+                <a16:creationId xmlns:a16="http://schemas.microsoft.com/office/drawing/2014/main" id="{4782A39A-A329-C207-4181-B32EBF9634FC}"/>
+              </a:ext>
+            </a:extLst>
+          </p:cNvPr>
+          <p:cNvPicPr>
+            <a:picLocks noChangeAspect="1"/>
+          </p:cNvPicPr>
+          <p:nvPr/>
+        </p:nvPicPr>
+        <p:blipFill>
+          <a:blip r:embed="rId5"/>
+          <a:stretch>
+            <a:fillRect/>
+          </a:stretch>
+        </p:blipFill>
+        <p:spPr>
+          <a:xfrm>
+            <a:off x="9213488" y="3015292"/>
+            <a:ext cx="1482610" cy="629275"/>
+          </a:xfrm>
+          <a:prstGeom prst="rect">
+            <a:avLst/>
+          </a:prstGeom>
+        </p:spPr>
+      </p:pic>
+      <p:sp>
+        <p:nvSpPr>
+          <p:cNvPr id="59" name="箭头: 右 58">
+            <a:extLst>
+              <a:ext uri="{FF2B5EF4-FFF2-40B4-BE49-F238E27FC236}">
+                <a16:creationId xmlns:a16="http://schemas.microsoft.com/office/drawing/2014/main" id="{2551ECD6-C700-40D2-75B1-DBD589E52561}"/>
+              </a:ext>
+            </a:extLst>
+          </p:cNvPr>
+          <p:cNvSpPr/>
+          <p:nvPr/>
+        </p:nvSpPr>
+        <p:spPr>
+          <a:xfrm>
+            <a:off x="8053592" y="2980816"/>
+            <a:ext cx="747623" cy="720000"/>
+          </a:xfrm>
+          <a:prstGeom prst="rightArrow">
+            <a:avLst/>
+          </a:prstGeom>
+        </p:spPr>
+        <p:style>
+          <a:lnRef idx="2">
+            <a:schemeClr val="accent1"/>
+          </a:lnRef>
+          <a:fillRef idx="1">
+            <a:schemeClr val="lt1"/>
+          </a:fillRef>
+          <a:effectRef idx="0">
+            <a:schemeClr val="accent1"/>
+          </a:effectRef>
+          <a:fontRef idx="minor">
+            <a:schemeClr val="dk1"/>
+          </a:fontRef>
+        </p:style>
+        <p:txBody>
+          <a:bodyPr rtlCol="0" anchor="ctr"/>
+          <a:lstStyle/>
+          <a:p>
+            <a:pPr algn="ctr"/>
+            <a:endParaRPr lang="zh-CN" altLang="en-US" dirty="0"/>
+          </a:p>
+        </p:txBody>
+      </p:sp>
+      <p:sp>
+        <p:nvSpPr>
+          <p:cNvPr id="97" name="文本框 96">
+            <a:extLst>
+              <a:ext uri="{FF2B5EF4-FFF2-40B4-BE49-F238E27FC236}">
+                <a16:creationId xmlns:a16="http://schemas.microsoft.com/office/drawing/2014/main" id="{CEF0A85B-A63F-E183-EADC-981E317E3787}"/>
+              </a:ext>
+            </a:extLst>
+          </p:cNvPr>
+          <p:cNvSpPr txBox="1"/>
+          <p:nvPr/>
+        </p:nvSpPr>
+        <p:spPr>
+          <a:xfrm>
+            <a:off x="1577617" y="3655453"/>
+            <a:ext cx="1036362" cy="338554"/>
+          </a:xfrm>
+          <a:prstGeom prst="rect">
+            <a:avLst/>
+          </a:prstGeom>
+          <a:noFill/>
+        </p:spPr>
+        <p:txBody>
+          <a:bodyPr wrap="square" lIns="36000" rIns="36000" rtlCol="0">
+            <a:spAutoFit/>
+          </a:bodyPr>
+          <a:lstStyle/>
+          <a:p>
+            <a:pPr algn="ctr"/>
+            <a:r>
+              <a:rPr lang="zh-CN" altLang="en-US" sz="1600" dirty="0"/>
+              <a:t>开始</a:t>
+            </a:r>
+            <a:endParaRPr lang="zh-CN" altLang="en-US" sz="1600" b="1" dirty="0"/>
+          </a:p>
+        </p:txBody>
+      </p:sp>
+    </p:spTree>
+    <p:extLst>
+      <p:ext uri="{BB962C8B-B14F-4D97-AF65-F5344CB8AC3E}">
+        <p14:creationId xmlns:p14="http://schemas.microsoft.com/office/powerpoint/2010/main" val="3650749298"/>
+      </p:ext>
+    </p:extLst>
+  </p:cSld>
+  <p:clrMapOvr>
+    <a:masterClrMapping/>
+  </p:clrMapOvr>
+</p:sld>
+</file>
+
 <file path=ppt/slides/slide2.xml><?xml version="1.0" encoding="utf-8"?>
 <p:sld xmlns:a="http://schemas.openxmlformats.org/drawingml/2006/main" xmlns:r="http://schemas.openxmlformats.org/officeDocument/2006/relationships" xmlns:p="http://schemas.openxmlformats.org/presentationml/2006/main">
   <p:cSld>
@@ -10132,6 +11182,16 @@
           <a:lstStyle/>
           <a:p>
             <a:pPr algn="ctr"/>
+            <a:r>
+              <a:rPr lang="en-US" altLang="zh-CN" sz="1300" b="1" dirty="0">
+                <a:solidFill>
+                  <a:schemeClr val="accent4">
+                    <a:lumMod val="75000"/>
+                  </a:schemeClr>
+                </a:solidFill>
+              </a:rPr>
+              <a:t>Key Release</a:t>
+            </a:r>
             <a:endParaRPr lang="zh-CN" altLang="en-US" sz="1300" b="1" dirty="0">
               <a:solidFill>
                 <a:schemeClr val="accent4">
@@ -10373,6 +11433,16 @@
           <a:lstStyle/>
           <a:p>
             <a:pPr algn="ctr"/>
+            <a:r>
+              <a:rPr lang="en-US" altLang="zh-CN" sz="1300" b="1" dirty="0">
+                <a:solidFill>
+                  <a:schemeClr val="accent4">
+                    <a:lumMod val="75000"/>
+                  </a:schemeClr>
+                </a:solidFill>
+              </a:rPr>
+              <a:t>Key Trigger</a:t>
+            </a:r>
             <a:endParaRPr lang="zh-CN" altLang="en-US" sz="1300" b="1" dirty="0">
               <a:solidFill>
                 <a:schemeClr val="accent4">
@@ -16078,6 +17148,418 @@
 <file path=ppt/slides/slide8.xml><?xml version="1.0" encoding="utf-8"?>
 <p:sld xmlns:a="http://schemas.openxmlformats.org/drawingml/2006/main" xmlns:r="http://schemas.openxmlformats.org/officeDocument/2006/relationships" xmlns:p="http://schemas.openxmlformats.org/presentationml/2006/main">
   <p:cSld>
+    <p:spTree>
+      <p:nvGrpSpPr>
+        <p:cNvPr id="1" name="">
+          <a:extLst>
+            <a:ext uri="{FF2B5EF4-FFF2-40B4-BE49-F238E27FC236}">
+              <a16:creationId xmlns:a16="http://schemas.microsoft.com/office/drawing/2014/main" id="{39D6536C-2D5B-255E-F403-E5A8664A7B9D}"/>
+            </a:ext>
+          </a:extLst>
+        </p:cNvPr>
+        <p:cNvGrpSpPr/>
+        <p:nvPr/>
+      </p:nvGrpSpPr>
+      <p:grpSpPr>
+        <a:xfrm>
+          <a:off x="0" y="0"/>
+          <a:ext cx="0" cy="0"/>
+          <a:chOff x="0" y="0"/>
+          <a:chExt cx="0" cy="0"/>
+        </a:xfrm>
+      </p:grpSpPr>
+      <p:sp>
+        <p:nvSpPr>
+          <p:cNvPr id="7" name="标题 6">
+            <a:extLst>
+              <a:ext uri="{FF2B5EF4-FFF2-40B4-BE49-F238E27FC236}">
+                <a16:creationId xmlns:a16="http://schemas.microsoft.com/office/drawing/2014/main" id="{B43CF955-8A26-A691-58D7-44361102E687}"/>
+              </a:ext>
+            </a:extLst>
+          </p:cNvPr>
+          <p:cNvSpPr>
+            <a:spLocks noGrp="1"/>
+          </p:cNvSpPr>
+          <p:nvPr>
+            <p:ph type="title"/>
+          </p:nvPr>
+        </p:nvSpPr>
+        <p:spPr/>
+        <p:txBody>
+          <a:bodyPr/>
+          <a:lstStyle/>
+          <a:p>
+            <a:r>
+              <a:rPr lang="en-US" altLang="zh-CN" dirty="0"/>
+              <a:t>Key Trigger/Release Distance</a:t>
+            </a:r>
+            <a:endParaRPr lang="zh-CN" altLang="en-US" dirty="0"/>
+          </a:p>
+        </p:txBody>
+      </p:sp>
+      <p:grpSp>
+        <p:nvGrpSpPr>
+          <p:cNvPr id="17" name="组合 16">
+            <a:extLst>
+              <a:ext uri="{FF2B5EF4-FFF2-40B4-BE49-F238E27FC236}">
+                <a16:creationId xmlns:a16="http://schemas.microsoft.com/office/drawing/2014/main" id="{3F5F9CD7-1681-2BF9-1643-0F0B6AE1D2E5}"/>
+              </a:ext>
+            </a:extLst>
+          </p:cNvPr>
+          <p:cNvGrpSpPr/>
+          <p:nvPr/>
+        </p:nvGrpSpPr>
+        <p:grpSpPr>
+          <a:xfrm>
+            <a:off x="4068963" y="1943978"/>
+            <a:ext cx="2780362" cy="1243731"/>
+            <a:chOff x="2477438" y="1454900"/>
+            <a:chExt cx="2780362" cy="1243731"/>
+          </a:xfrm>
+        </p:grpSpPr>
+        <p:pic>
+          <p:nvPicPr>
+            <p:cNvPr id="4" name="图片 3">
+              <a:extLst>
+                <a:ext uri="{FF2B5EF4-FFF2-40B4-BE49-F238E27FC236}">
+                  <a16:creationId xmlns:a16="http://schemas.microsoft.com/office/drawing/2014/main" id="{306CF81C-978E-EE26-18B1-57950B86331D}"/>
+                </a:ext>
+              </a:extLst>
+            </p:cNvPr>
+            <p:cNvPicPr>
+              <a:picLocks noChangeAspect="1"/>
+            </p:cNvPicPr>
+            <p:nvPr/>
+          </p:nvPicPr>
+          <p:blipFill>
+            <a:blip r:embed="rId2"/>
+            <a:stretch>
+              <a:fillRect/>
+            </a:stretch>
+          </p:blipFill>
+          <p:spPr>
+            <a:xfrm>
+              <a:off x="2477438" y="1454900"/>
+              <a:ext cx="1283680" cy="1243731"/>
+            </a:xfrm>
+            <a:prstGeom prst="rect">
+              <a:avLst/>
+            </a:prstGeom>
+          </p:spPr>
+        </p:pic>
+        <p:sp>
+          <p:nvSpPr>
+            <p:cNvPr id="8" name="文本框 7">
+              <a:extLst>
+                <a:ext uri="{FF2B5EF4-FFF2-40B4-BE49-F238E27FC236}">
+                  <a16:creationId xmlns:a16="http://schemas.microsoft.com/office/drawing/2014/main" id="{7B35972E-3677-515D-643C-BC6D473D3F55}"/>
+                </a:ext>
+              </a:extLst>
+            </p:cNvPr>
+            <p:cNvSpPr txBox="1"/>
+            <p:nvPr/>
+          </p:nvSpPr>
+          <p:spPr>
+            <a:xfrm>
+              <a:off x="3974120" y="1934711"/>
+              <a:ext cx="1283680" cy="338554"/>
+            </a:xfrm>
+            <a:prstGeom prst="rect">
+              <a:avLst/>
+            </a:prstGeom>
+            <a:noFill/>
+          </p:spPr>
+          <p:txBody>
+            <a:bodyPr wrap="square" lIns="36000" rIns="36000" rtlCol="0">
+              <a:spAutoFit/>
+            </a:bodyPr>
+            <a:lstStyle/>
+            <a:p>
+              <a:pPr algn="ctr"/>
+              <a:r>
+                <a:rPr lang="en-US" altLang="zh-CN" sz="1600" b="1" dirty="0"/>
+                <a:t>Set Distance</a:t>
+              </a:r>
+              <a:endParaRPr lang="zh-CN" altLang="en-US" sz="1600" b="1" dirty="0"/>
+            </a:p>
+          </p:txBody>
+        </p:sp>
+      </p:grpSp>
+      <p:graphicFrame>
+        <p:nvGraphicFramePr>
+          <p:cNvPr id="13" name="对象 12">
+            <a:extLst>
+              <a:ext uri="{FF2B5EF4-FFF2-40B4-BE49-F238E27FC236}">
+                <a16:creationId xmlns:a16="http://schemas.microsoft.com/office/drawing/2014/main" id="{347E18AB-89B5-FD16-0D34-12ABE4ECFE56}"/>
+              </a:ext>
+            </a:extLst>
+          </p:cNvPr>
+          <p:cNvGraphicFramePr>
+            <a:graphicFrameLocks noChangeAspect="1"/>
+          </p:cNvGraphicFramePr>
+          <p:nvPr>
+            <p:extLst>
+              <p:ext uri="{D42A27DB-BD31-4B8C-83A1-F6EECF244321}">
+                <p14:modId xmlns:p14="http://schemas.microsoft.com/office/powerpoint/2010/main" val="3008630389"/>
+              </p:ext>
+            </p:extLst>
+          </p:nvPr>
+        </p:nvGraphicFramePr>
+        <p:xfrm>
+          <a:off x="4175192" y="3706760"/>
+          <a:ext cx="1025030" cy="915371"/>
+        </p:xfrm>
+        <a:graphic>
+          <a:graphicData uri="http://schemas.openxmlformats.org/presentationml/2006/ole">
+            <mc:AlternateContent xmlns:mc="http://schemas.openxmlformats.org/markup-compatibility/2006">
+              <mc:Choice xmlns:v="urn:schemas-microsoft-com:vml" Requires="v">
+                <p:oleObj r:id="rId3" imgW="1750685" imgH="1563257" progId="">
+                  <p:embed/>
+                </p:oleObj>
+              </mc:Choice>
+              <mc:Fallback>
+                <p:oleObj r:id="rId3" imgW="1750685" imgH="1563257" progId="">
+                  <p:embed/>
+                  <p:pic>
+                    <p:nvPicPr>
+                      <p:cNvPr id="13" name="对象 12">
+                        <a:extLst>
+                          <a:ext uri="{FF2B5EF4-FFF2-40B4-BE49-F238E27FC236}">
+                            <a16:creationId xmlns:a16="http://schemas.microsoft.com/office/drawing/2014/main" id="{09C9B7E9-DC1D-E65A-AD14-69C34CC83A8A}"/>
+                          </a:ext>
+                        </a:extLst>
+                      </p:cNvPr>
+                      <p:cNvPicPr/>
+                      <p:nvPr/>
+                    </p:nvPicPr>
+                    <p:blipFill>
+                      <a:blip r:embed="rId4"/>
+                      <a:stretch>
+                        <a:fillRect/>
+                      </a:stretch>
+                    </p:blipFill>
+                    <p:spPr>
+                      <a:xfrm>
+                        <a:off x="4175192" y="3706760"/>
+                        <a:ext cx="1025030" cy="915371"/>
+                      </a:xfrm>
+                      <a:prstGeom prst="rect">
+                        <a:avLst/>
+                      </a:prstGeom>
+                    </p:spPr>
+                  </p:pic>
+                </p:oleObj>
+              </mc:Fallback>
+            </mc:AlternateContent>
+          </a:graphicData>
+        </a:graphic>
+      </p:graphicFrame>
+      <p:sp>
+        <p:nvSpPr>
+          <p:cNvPr id="16" name="箭头: 右 15">
+            <a:extLst>
+              <a:ext uri="{FF2B5EF4-FFF2-40B4-BE49-F238E27FC236}">
+                <a16:creationId xmlns:a16="http://schemas.microsoft.com/office/drawing/2014/main" id="{2A7C2725-79BF-6C36-C3E3-889679282222}"/>
+              </a:ext>
+            </a:extLst>
+          </p:cNvPr>
+          <p:cNvSpPr/>
+          <p:nvPr/>
+        </p:nvSpPr>
+        <p:spPr>
+          <a:xfrm>
+            <a:off x="1731839" y="2827709"/>
+            <a:ext cx="747623" cy="720000"/>
+          </a:xfrm>
+          <a:prstGeom prst="rightArrow">
+            <a:avLst/>
+          </a:prstGeom>
+        </p:spPr>
+        <p:style>
+          <a:lnRef idx="2">
+            <a:schemeClr val="accent1"/>
+          </a:lnRef>
+          <a:fillRef idx="1">
+            <a:schemeClr val="lt1"/>
+          </a:fillRef>
+          <a:effectRef idx="0">
+            <a:schemeClr val="accent1"/>
+          </a:effectRef>
+          <a:fontRef idx="minor">
+            <a:schemeClr val="dk1"/>
+          </a:fontRef>
+        </p:style>
+        <p:txBody>
+          <a:bodyPr rtlCol="0" anchor="ctr"/>
+          <a:lstStyle/>
+          <a:p>
+            <a:pPr algn="ctr"/>
+            <a:endParaRPr lang="zh-CN" altLang="en-US" dirty="0"/>
+          </a:p>
+        </p:txBody>
+      </p:sp>
+      <p:sp>
+        <p:nvSpPr>
+          <p:cNvPr id="34" name="文本框 33">
+            <a:extLst>
+              <a:ext uri="{FF2B5EF4-FFF2-40B4-BE49-F238E27FC236}">
+                <a16:creationId xmlns:a16="http://schemas.microsoft.com/office/drawing/2014/main" id="{DA1A2D11-0F9D-C759-C60F-35F823CC0694}"/>
+              </a:ext>
+            </a:extLst>
+          </p:cNvPr>
+          <p:cNvSpPr txBox="1"/>
+          <p:nvPr/>
+        </p:nvSpPr>
+        <p:spPr>
+          <a:xfrm>
+            <a:off x="5459144" y="3994007"/>
+            <a:ext cx="2206172" cy="338554"/>
+          </a:xfrm>
+          <a:prstGeom prst="rect">
+            <a:avLst/>
+          </a:prstGeom>
+          <a:noFill/>
+        </p:spPr>
+        <p:txBody>
+          <a:bodyPr wrap="square" rtlCol="0">
+            <a:spAutoFit/>
+          </a:bodyPr>
+          <a:lstStyle/>
+          <a:p>
+            <a:r>
+              <a:rPr lang="en-US" altLang="zh-CN" sz="1600" b="1" dirty="0"/>
+              <a:t>Select Keys to Apply</a:t>
+            </a:r>
+          </a:p>
+        </p:txBody>
+      </p:sp>
+      <p:pic>
+        <p:nvPicPr>
+          <p:cNvPr id="38" name="图片 37">
+            <a:extLst>
+              <a:ext uri="{FF2B5EF4-FFF2-40B4-BE49-F238E27FC236}">
+                <a16:creationId xmlns:a16="http://schemas.microsoft.com/office/drawing/2014/main" id="{33286B5C-F81E-7BED-1E78-E4057B5CB034}"/>
+              </a:ext>
+            </a:extLst>
+          </p:cNvPr>
+          <p:cNvPicPr>
+            <a:picLocks noChangeAspect="1"/>
+          </p:cNvPicPr>
+          <p:nvPr/>
+        </p:nvPicPr>
+        <p:blipFill>
+          <a:blip r:embed="rId5"/>
+          <a:stretch>
+            <a:fillRect/>
+          </a:stretch>
+        </p:blipFill>
+        <p:spPr>
+          <a:xfrm>
+            <a:off x="9213488" y="3015292"/>
+            <a:ext cx="1482610" cy="629275"/>
+          </a:xfrm>
+          <a:prstGeom prst="rect">
+            <a:avLst/>
+          </a:prstGeom>
+        </p:spPr>
+      </p:pic>
+      <p:sp>
+        <p:nvSpPr>
+          <p:cNvPr id="59" name="箭头: 右 58">
+            <a:extLst>
+              <a:ext uri="{FF2B5EF4-FFF2-40B4-BE49-F238E27FC236}">
+                <a16:creationId xmlns:a16="http://schemas.microsoft.com/office/drawing/2014/main" id="{CC21B699-0090-6327-4C5A-2639152D79AE}"/>
+              </a:ext>
+            </a:extLst>
+          </p:cNvPr>
+          <p:cNvSpPr/>
+          <p:nvPr/>
+        </p:nvSpPr>
+        <p:spPr>
+          <a:xfrm>
+            <a:off x="8053592" y="2980816"/>
+            <a:ext cx="747623" cy="720000"/>
+          </a:xfrm>
+          <a:prstGeom prst="rightArrow">
+            <a:avLst/>
+          </a:prstGeom>
+        </p:spPr>
+        <p:style>
+          <a:lnRef idx="2">
+            <a:schemeClr val="accent1"/>
+          </a:lnRef>
+          <a:fillRef idx="1">
+            <a:schemeClr val="lt1"/>
+          </a:fillRef>
+          <a:effectRef idx="0">
+            <a:schemeClr val="accent1"/>
+          </a:effectRef>
+          <a:fontRef idx="minor">
+            <a:schemeClr val="dk1"/>
+          </a:fontRef>
+        </p:style>
+        <p:txBody>
+          <a:bodyPr rtlCol="0" anchor="ctr"/>
+          <a:lstStyle/>
+          <a:p>
+            <a:pPr algn="ctr"/>
+            <a:endParaRPr lang="zh-CN" altLang="en-US" dirty="0"/>
+          </a:p>
+        </p:txBody>
+      </p:sp>
+      <p:sp>
+        <p:nvSpPr>
+          <p:cNvPr id="97" name="文本框 96">
+            <a:extLst>
+              <a:ext uri="{FF2B5EF4-FFF2-40B4-BE49-F238E27FC236}">
+                <a16:creationId xmlns:a16="http://schemas.microsoft.com/office/drawing/2014/main" id="{BF46E06F-EDAC-8C31-712C-A68F3B1198EE}"/>
+              </a:ext>
+            </a:extLst>
+          </p:cNvPr>
+          <p:cNvSpPr txBox="1"/>
+          <p:nvPr/>
+        </p:nvSpPr>
+        <p:spPr>
+          <a:xfrm>
+            <a:off x="1577617" y="3655453"/>
+            <a:ext cx="1036362" cy="338554"/>
+          </a:xfrm>
+          <a:prstGeom prst="rect">
+            <a:avLst/>
+          </a:prstGeom>
+          <a:noFill/>
+        </p:spPr>
+        <p:txBody>
+          <a:bodyPr wrap="square" lIns="36000" rIns="36000" rtlCol="0">
+            <a:spAutoFit/>
+          </a:bodyPr>
+          <a:lstStyle/>
+          <a:p>
+            <a:pPr algn="ctr"/>
+            <a:r>
+              <a:rPr lang="en-US" altLang="zh-CN" sz="1600" b="1" dirty="0"/>
+              <a:t>Start</a:t>
+            </a:r>
+            <a:endParaRPr lang="zh-CN" altLang="en-US" sz="1600" b="1" dirty="0"/>
+          </a:p>
+        </p:txBody>
+      </p:sp>
+    </p:spTree>
+    <p:extLst>
+      <p:ext uri="{BB962C8B-B14F-4D97-AF65-F5344CB8AC3E}">
+        <p14:creationId xmlns:p14="http://schemas.microsoft.com/office/powerpoint/2010/main" val="3784649761"/>
+      </p:ext>
+    </p:extLst>
+  </p:cSld>
+  <p:clrMapOvr>
+    <a:masterClrMapping/>
+  </p:clrMapOvr>
+</p:sld>
+</file>
+
+<file path=ppt/slides/slide9.xml><?xml version="1.0" encoding="utf-8"?>
+<p:sld xmlns:a="http://schemas.openxmlformats.org/drawingml/2006/main" xmlns:r="http://schemas.openxmlformats.org/officeDocument/2006/relationships" xmlns:p="http://schemas.openxmlformats.org/presentationml/2006/main">
+  <p:cSld>
     <p:bg>
       <p:bgPr>
         <a:solidFill>
@@ -16258,598 +17740,6 @@
     <p:extLst>
       <p:ext uri="{BB962C8B-B14F-4D97-AF65-F5344CB8AC3E}">
         <p14:creationId xmlns:p14="http://schemas.microsoft.com/office/powerpoint/2010/main" val="3381834881"/>
-      </p:ext>
-    </p:extLst>
-  </p:cSld>
-  <p:clrMapOvr>
-    <a:masterClrMapping/>
-  </p:clrMapOvr>
-</p:sld>
-</file>
-
-<file path=ppt/slides/slide9.xml><?xml version="1.0" encoding="utf-8"?>
-<p:sld xmlns:a="http://schemas.openxmlformats.org/drawingml/2006/main" xmlns:r="http://schemas.openxmlformats.org/officeDocument/2006/relationships" xmlns:p="http://schemas.openxmlformats.org/presentationml/2006/main">
-  <p:cSld>
-    <p:bg>
-      <p:bgPr>
-        <a:solidFill>
-          <a:srgbClr val="FFFFE5"/>
-        </a:solidFill>
-        <a:effectLst/>
-      </p:bgPr>
-    </p:bg>
-    <p:spTree>
-      <p:nvGrpSpPr>
-        <p:cNvPr id="1" name="">
-          <a:extLst>
-            <a:ext uri="{FF2B5EF4-FFF2-40B4-BE49-F238E27FC236}">
-              <a16:creationId xmlns:a16="http://schemas.microsoft.com/office/drawing/2014/main" id="{61F1D812-5BA9-0BB6-A2CB-8144F2050635}"/>
-            </a:ext>
-          </a:extLst>
-        </p:cNvPr>
-        <p:cNvGrpSpPr/>
-        <p:nvPr/>
-      </p:nvGrpSpPr>
-      <p:grpSpPr>
-        <a:xfrm>
-          <a:off x="0" y="0"/>
-          <a:ext cx="0" cy="0"/>
-          <a:chOff x="0" y="0"/>
-          <a:chExt cx="0" cy="0"/>
-        </a:xfrm>
-      </p:grpSpPr>
-      <p:sp>
-        <p:nvSpPr>
-          <p:cNvPr id="3" name="标题 2">
-            <a:extLst>
-              <a:ext uri="{FF2B5EF4-FFF2-40B4-BE49-F238E27FC236}">
-                <a16:creationId xmlns:a16="http://schemas.microsoft.com/office/drawing/2014/main" id="{C95C3CBE-D830-48AE-C36C-371E973ABD59}"/>
-              </a:ext>
-            </a:extLst>
-          </p:cNvPr>
-          <p:cNvSpPr>
-            <a:spLocks noGrp="1"/>
-          </p:cNvSpPr>
-          <p:nvPr>
-            <p:ph type="title"/>
-          </p:nvPr>
-        </p:nvSpPr>
-        <p:spPr/>
-        <p:txBody>
-          <a:bodyPr/>
-          <a:lstStyle/>
-          <a:p>
-            <a:r>
-              <a:rPr lang="zh-CN" altLang="en-US" dirty="0"/>
-              <a:t>上电</a:t>
-            </a:r>
-          </a:p>
-        </p:txBody>
-      </p:sp>
-      <p:sp>
-        <p:nvSpPr>
-          <p:cNvPr id="4" name="矩形: 圆角 3">
-            <a:extLst>
-              <a:ext uri="{FF2B5EF4-FFF2-40B4-BE49-F238E27FC236}">
-                <a16:creationId xmlns:a16="http://schemas.microsoft.com/office/drawing/2014/main" id="{5185EF17-572E-6637-7D80-31307BF54A05}"/>
-              </a:ext>
-            </a:extLst>
-          </p:cNvPr>
-          <p:cNvSpPr/>
-          <p:nvPr/>
-        </p:nvSpPr>
-        <p:spPr>
-          <a:xfrm>
-            <a:off x="9928225" y="1540931"/>
-            <a:ext cx="190500" cy="203200"/>
-          </a:xfrm>
-          <a:prstGeom prst="roundRect">
-            <a:avLst/>
-          </a:prstGeom>
-          <a:solidFill>
-            <a:srgbClr val="FF0000">
-              <a:alpha val="50196"/>
-            </a:srgbClr>
-          </a:solidFill>
-          <a:ln>
-            <a:noFill/>
-          </a:ln>
-        </p:spPr>
-        <p:style>
-          <a:lnRef idx="2">
-            <a:schemeClr val="accent1">
-              <a:shade val="50000"/>
-            </a:schemeClr>
-          </a:lnRef>
-          <a:fillRef idx="1">
-            <a:schemeClr val="accent1"/>
-          </a:fillRef>
-          <a:effectRef idx="0">
-            <a:schemeClr val="accent1"/>
-          </a:effectRef>
-          <a:fontRef idx="minor">
-            <a:schemeClr val="lt1"/>
-          </a:fontRef>
-        </p:style>
-        <p:txBody>
-          <a:bodyPr rtlCol="0" anchor="ctr"/>
-          <a:lstStyle/>
-          <a:p>
-            <a:pPr algn="ctr"/>
-            <a:endParaRPr lang="zh-CN" altLang="en-US"/>
-          </a:p>
-        </p:txBody>
-      </p:sp>
-      <p:sp>
-        <p:nvSpPr>
-          <p:cNvPr id="7" name="矩形: 圆角 6">
-            <a:extLst>
-              <a:ext uri="{FF2B5EF4-FFF2-40B4-BE49-F238E27FC236}">
-                <a16:creationId xmlns:a16="http://schemas.microsoft.com/office/drawing/2014/main" id="{00BF303D-C3A7-A6FE-A8B7-83BDA49410F8}"/>
-              </a:ext>
-            </a:extLst>
-          </p:cNvPr>
-          <p:cNvSpPr/>
-          <p:nvPr/>
-        </p:nvSpPr>
-        <p:spPr>
-          <a:xfrm>
-            <a:off x="10202862" y="1540931"/>
-            <a:ext cx="190500" cy="203200"/>
-          </a:xfrm>
-          <a:prstGeom prst="roundRect">
-            <a:avLst/>
-          </a:prstGeom>
-          <a:solidFill>
-            <a:srgbClr val="FF0000">
-              <a:alpha val="50196"/>
-            </a:srgbClr>
-          </a:solidFill>
-          <a:ln>
-            <a:noFill/>
-          </a:ln>
-        </p:spPr>
-        <p:style>
-          <a:lnRef idx="2">
-            <a:schemeClr val="accent1">
-              <a:shade val="50000"/>
-            </a:schemeClr>
-          </a:lnRef>
-          <a:fillRef idx="1">
-            <a:schemeClr val="accent1"/>
-          </a:fillRef>
-          <a:effectRef idx="0">
-            <a:schemeClr val="accent1"/>
-          </a:effectRef>
-          <a:fontRef idx="minor">
-            <a:schemeClr val="lt1"/>
-          </a:fontRef>
-        </p:style>
-        <p:txBody>
-          <a:bodyPr rtlCol="0" anchor="ctr"/>
-          <a:lstStyle/>
-          <a:p>
-            <a:pPr algn="ctr"/>
-            <a:endParaRPr lang="zh-CN" altLang="en-US"/>
-          </a:p>
-        </p:txBody>
-      </p:sp>
-      <p:sp>
-        <p:nvSpPr>
-          <p:cNvPr id="21" name="文本框 20">
-            <a:extLst>
-              <a:ext uri="{FF2B5EF4-FFF2-40B4-BE49-F238E27FC236}">
-                <a16:creationId xmlns:a16="http://schemas.microsoft.com/office/drawing/2014/main" id="{D0208DEA-27EC-BDAB-AE6F-6042613ECF68}"/>
-              </a:ext>
-            </a:extLst>
-          </p:cNvPr>
-          <p:cNvSpPr txBox="1"/>
-          <p:nvPr/>
-        </p:nvSpPr>
-        <p:spPr>
-          <a:xfrm>
-            <a:off x="8712200" y="627757"/>
-            <a:ext cx="1012216" cy="303536"/>
-          </a:xfrm>
-          <a:prstGeom prst="rect">
-            <a:avLst/>
-          </a:prstGeom>
-          <a:noFill/>
-        </p:spPr>
-        <p:txBody>
-          <a:bodyPr wrap="square" lIns="36000" tIns="36000" rIns="36000" bIns="36000" rtlCol="0">
-            <a:spAutoFit/>
-          </a:bodyPr>
-          <a:lstStyle/>
-          <a:p>
-            <a:pPr algn="ctr">
-              <a:lnSpc>
-                <a:spcPts val="1800"/>
-              </a:lnSpc>
-            </a:pPr>
-            <a:r>
-              <a:rPr lang="zh-CN" altLang="en-US" sz="1600" b="1" dirty="0">
-                <a:solidFill>
-                  <a:schemeClr val="accent1">
-                    <a:lumMod val="75000"/>
-                  </a:schemeClr>
-                </a:solidFill>
-              </a:rPr>
-              <a:t>普通设备</a:t>
-            </a:r>
-          </a:p>
-        </p:txBody>
-      </p:sp>
-      <p:cxnSp>
-        <p:nvCxnSpPr>
-          <p:cNvPr id="28" name="连接符: 肘形 27">
-            <a:extLst>
-              <a:ext uri="{FF2B5EF4-FFF2-40B4-BE49-F238E27FC236}">
-                <a16:creationId xmlns:a16="http://schemas.microsoft.com/office/drawing/2014/main" id="{1B444566-DD0C-E75E-2CB9-9CD5E45AD36D}"/>
-              </a:ext>
-            </a:extLst>
-          </p:cNvPr>
-          <p:cNvCxnSpPr>
-            <a:cxnSpLocks/>
-            <a:stCxn id="21" idx="3"/>
-            <a:endCxn id="4" idx="0"/>
-          </p:cNvCxnSpPr>
-          <p:nvPr/>
-        </p:nvCxnSpPr>
-        <p:spPr>
-          <a:xfrm>
-            <a:off x="9724416" y="779525"/>
-            <a:ext cx="299059" cy="761406"/>
-          </a:xfrm>
-          <a:prstGeom prst="bentConnector2">
-            <a:avLst/>
-          </a:prstGeom>
-          <a:ln w="28575">
-            <a:solidFill>
-              <a:srgbClr val="FF0000"/>
-            </a:solidFill>
-            <a:prstDash val="sysDot"/>
-          </a:ln>
-        </p:spPr>
-        <p:style>
-          <a:lnRef idx="1">
-            <a:schemeClr val="accent1"/>
-          </a:lnRef>
-          <a:fillRef idx="0">
-            <a:schemeClr val="accent1"/>
-          </a:fillRef>
-          <a:effectRef idx="0">
-            <a:schemeClr val="accent1"/>
-          </a:effectRef>
-          <a:fontRef idx="minor">
-            <a:schemeClr val="tx1"/>
-          </a:fontRef>
-        </p:style>
-      </p:cxnSp>
-      <p:cxnSp>
-        <p:nvCxnSpPr>
-          <p:cNvPr id="29" name="连接符: 肘形 28">
-            <a:extLst>
-              <a:ext uri="{FF2B5EF4-FFF2-40B4-BE49-F238E27FC236}">
-                <a16:creationId xmlns:a16="http://schemas.microsoft.com/office/drawing/2014/main" id="{C6F08998-9D1D-7156-08CC-54F15038B613}"/>
-              </a:ext>
-            </a:extLst>
-          </p:cNvPr>
-          <p:cNvCxnSpPr>
-            <a:cxnSpLocks/>
-            <a:stCxn id="4" idx="2"/>
-            <a:endCxn id="32" idx="1"/>
-          </p:cNvCxnSpPr>
-          <p:nvPr/>
-        </p:nvCxnSpPr>
-        <p:spPr>
-          <a:xfrm rot="16200000" flipH="1">
-            <a:off x="10397845" y="1369760"/>
-            <a:ext cx="135002" cy="883743"/>
-          </a:xfrm>
-          <a:prstGeom prst="bentConnector2">
-            <a:avLst/>
-          </a:prstGeom>
-          <a:ln w="28575">
-            <a:solidFill>
-              <a:srgbClr val="FF0000"/>
-            </a:solidFill>
-            <a:prstDash val="sysDot"/>
-          </a:ln>
-        </p:spPr>
-        <p:style>
-          <a:lnRef idx="1">
-            <a:schemeClr val="accent1"/>
-          </a:lnRef>
-          <a:fillRef idx="0">
-            <a:schemeClr val="accent1"/>
-          </a:fillRef>
-          <a:effectRef idx="0">
-            <a:schemeClr val="accent1"/>
-          </a:effectRef>
-          <a:fontRef idx="minor">
-            <a:schemeClr val="tx1"/>
-          </a:fontRef>
-        </p:style>
-      </p:cxnSp>
-      <p:sp>
-        <p:nvSpPr>
-          <p:cNvPr id="32" name="文本框 31">
-            <a:extLst>
-              <a:ext uri="{FF2B5EF4-FFF2-40B4-BE49-F238E27FC236}">
-                <a16:creationId xmlns:a16="http://schemas.microsoft.com/office/drawing/2014/main" id="{EF22CD16-C4EC-CB5E-5C31-BC94328A0821}"/>
-              </a:ext>
-            </a:extLst>
-          </p:cNvPr>
-          <p:cNvSpPr txBox="1"/>
-          <p:nvPr/>
-        </p:nvSpPr>
-        <p:spPr>
-          <a:xfrm>
-            <a:off x="10907218" y="1727365"/>
-            <a:ext cx="1004489" cy="303536"/>
-          </a:xfrm>
-          <a:prstGeom prst="rect">
-            <a:avLst/>
-          </a:prstGeom>
-          <a:noFill/>
-        </p:spPr>
-        <p:txBody>
-          <a:bodyPr wrap="square" lIns="36000" tIns="36000" rIns="36000" bIns="36000" rtlCol="0">
-            <a:spAutoFit/>
-          </a:bodyPr>
-          <a:lstStyle/>
-          <a:p>
-            <a:pPr algn="ctr">
-              <a:lnSpc>
-                <a:spcPts val="1800"/>
-              </a:lnSpc>
-            </a:pPr>
-            <a:r>
-              <a:rPr lang="zh-CN" altLang="en-US" sz="1600" b="1" dirty="0">
-                <a:solidFill>
-                  <a:schemeClr val="accent1">
-                    <a:lumMod val="75000"/>
-                  </a:schemeClr>
-                </a:solidFill>
-              </a:rPr>
-              <a:t>固件更新</a:t>
-            </a:r>
-          </a:p>
-        </p:txBody>
-      </p:sp>
-      <p:sp>
-        <p:nvSpPr>
-          <p:cNvPr id="43" name="文本框 42">
-            <a:extLst>
-              <a:ext uri="{FF2B5EF4-FFF2-40B4-BE49-F238E27FC236}">
-                <a16:creationId xmlns:a16="http://schemas.microsoft.com/office/drawing/2014/main" id="{FE497A5C-E648-8EF0-1D63-03B5D08B21FB}"/>
-              </a:ext>
-            </a:extLst>
-          </p:cNvPr>
-          <p:cNvSpPr txBox="1"/>
-          <p:nvPr/>
-        </p:nvSpPr>
-        <p:spPr>
-          <a:xfrm>
-            <a:off x="10507110" y="627757"/>
-            <a:ext cx="1404597" cy="303536"/>
-          </a:xfrm>
-          <a:prstGeom prst="rect">
-            <a:avLst/>
-          </a:prstGeom>
-          <a:noFill/>
-        </p:spPr>
-        <p:txBody>
-          <a:bodyPr wrap="square" lIns="36000" tIns="36000" rIns="36000" bIns="36000" rtlCol="0">
-            <a:spAutoFit/>
-          </a:bodyPr>
-          <a:lstStyle/>
-          <a:p>
-            <a:pPr algn="ctr">
-              <a:lnSpc>
-                <a:spcPts val="1800"/>
-              </a:lnSpc>
-            </a:pPr>
-            <a:r>
-              <a:rPr lang="en-US" altLang="zh-CN" sz="1600" b="1" dirty="0">
-                <a:solidFill>
-                  <a:schemeClr val="accent1">
-                    <a:lumMod val="75000"/>
-                  </a:schemeClr>
-                </a:solidFill>
-              </a:rPr>
-              <a:t>KONAMI </a:t>
-            </a:r>
-            <a:r>
-              <a:rPr lang="zh-CN" altLang="en-US" sz="1600" b="1" dirty="0">
-                <a:solidFill>
-                  <a:schemeClr val="accent1">
-                    <a:lumMod val="75000"/>
-                  </a:schemeClr>
-                </a:solidFill>
-              </a:rPr>
-              <a:t>设备</a:t>
-            </a:r>
-          </a:p>
-        </p:txBody>
-      </p:sp>
-      <p:cxnSp>
-        <p:nvCxnSpPr>
-          <p:cNvPr id="44" name="连接符: 肘形 43">
-            <a:extLst>
-              <a:ext uri="{FF2B5EF4-FFF2-40B4-BE49-F238E27FC236}">
-                <a16:creationId xmlns:a16="http://schemas.microsoft.com/office/drawing/2014/main" id="{5C669BF4-6EAA-6C08-7BEB-8A19558E53C9}"/>
-              </a:ext>
-            </a:extLst>
-          </p:cNvPr>
-          <p:cNvCxnSpPr>
-            <a:cxnSpLocks/>
-            <a:stCxn id="43" idx="1"/>
-            <a:endCxn id="7" idx="0"/>
-          </p:cNvCxnSpPr>
-          <p:nvPr/>
-        </p:nvCxnSpPr>
-        <p:spPr>
-          <a:xfrm rot="10800000" flipV="1">
-            <a:off x="10298112" y="779525"/>
-            <a:ext cx="208998" cy="761406"/>
-          </a:xfrm>
-          <a:prstGeom prst="bentConnector2">
-            <a:avLst/>
-          </a:prstGeom>
-          <a:ln w="28575">
-            <a:solidFill>
-              <a:srgbClr val="FF0000"/>
-            </a:solidFill>
-            <a:prstDash val="sysDot"/>
-          </a:ln>
-        </p:spPr>
-        <p:style>
-          <a:lnRef idx="1">
-            <a:schemeClr val="accent1"/>
-          </a:lnRef>
-          <a:fillRef idx="0">
-            <a:schemeClr val="accent1"/>
-          </a:fillRef>
-          <a:effectRef idx="0">
-            <a:schemeClr val="accent1"/>
-          </a:effectRef>
-          <a:fontRef idx="minor">
-            <a:schemeClr val="tx1"/>
-          </a:fontRef>
-        </p:style>
-      </p:cxnSp>
-      <p:cxnSp>
-        <p:nvCxnSpPr>
-          <p:cNvPr id="50" name="连接符: 肘形 49">
-            <a:extLst>
-              <a:ext uri="{FF2B5EF4-FFF2-40B4-BE49-F238E27FC236}">
-                <a16:creationId xmlns:a16="http://schemas.microsoft.com/office/drawing/2014/main" id="{474A83A9-BC29-D99F-6F99-AD99E702EC46}"/>
-              </a:ext>
-            </a:extLst>
-          </p:cNvPr>
-          <p:cNvCxnSpPr>
-            <a:cxnSpLocks/>
-            <a:stCxn id="7" idx="2"/>
-            <a:endCxn id="32" idx="1"/>
-          </p:cNvCxnSpPr>
-          <p:nvPr/>
-        </p:nvCxnSpPr>
-        <p:spPr>
-          <a:xfrm rot="16200000" flipH="1">
-            <a:off x="10535164" y="1507079"/>
-            <a:ext cx="135002" cy="609106"/>
-          </a:xfrm>
-          <a:prstGeom prst="bentConnector2">
-            <a:avLst/>
-          </a:prstGeom>
-          <a:ln w="28575">
-            <a:solidFill>
-              <a:srgbClr val="FF0000"/>
-            </a:solidFill>
-            <a:prstDash val="sysDot"/>
-          </a:ln>
-        </p:spPr>
-        <p:style>
-          <a:lnRef idx="1">
-            <a:schemeClr val="accent1"/>
-          </a:lnRef>
-          <a:fillRef idx="0">
-            <a:schemeClr val="accent1"/>
-          </a:fillRef>
-          <a:effectRef idx="0">
-            <a:schemeClr val="accent1"/>
-          </a:effectRef>
-          <a:fontRef idx="minor">
-            <a:schemeClr val="tx1"/>
-          </a:fontRef>
-        </p:style>
-      </p:cxnSp>
-      <p:sp>
-        <p:nvSpPr>
-          <p:cNvPr id="55" name="文本框 54">
-            <a:extLst>
-              <a:ext uri="{FF2B5EF4-FFF2-40B4-BE49-F238E27FC236}">
-                <a16:creationId xmlns:a16="http://schemas.microsoft.com/office/drawing/2014/main" id="{DC4DDEC2-D731-819F-716B-4505E2236D05}"/>
-              </a:ext>
-            </a:extLst>
-          </p:cNvPr>
-          <p:cNvSpPr txBox="1"/>
-          <p:nvPr/>
-        </p:nvSpPr>
-        <p:spPr>
-          <a:xfrm>
-            <a:off x="8768596" y="244470"/>
-            <a:ext cx="2626526" cy="239415"/>
-          </a:xfrm>
-          <a:prstGeom prst="rect">
-            <a:avLst/>
-          </a:prstGeom>
-          <a:solidFill>
-            <a:schemeClr val="bg1">
-              <a:lumMod val="85000"/>
-            </a:schemeClr>
-          </a:solidFill>
-          <a:ln w="9525">
-            <a:solidFill>
-              <a:srgbClr val="0070C0"/>
-            </a:solidFill>
-            <a:prstDash val="sysDot"/>
-          </a:ln>
-          <a:effectLst/>
-        </p:spPr>
-        <p:txBody>
-          <a:bodyPr wrap="square" lIns="54000" tIns="36000" rIns="36000" bIns="36000" rtlCol="0">
-            <a:spAutoFit/>
-          </a:bodyPr>
-          <a:lstStyle/>
-          <a:p>
-            <a:pPr>
-              <a:lnSpc>
-                <a:spcPts val="1300"/>
-              </a:lnSpc>
-            </a:pPr>
-            <a:r>
-              <a:rPr lang="zh-CN" altLang="en-US" sz="1200" b="1" dirty="0">
-                <a:solidFill>
-                  <a:schemeClr val="tx1">
-                    <a:lumMod val="75000"/>
-                    <a:lumOff val="25000"/>
-                  </a:schemeClr>
-                </a:solidFill>
-              </a:rPr>
-              <a:t>设备模式会存储在 </a:t>
-            </a:r>
-            <a:r>
-              <a:rPr lang="en-US" altLang="zh-CN" sz="1200" b="1" dirty="0">
-                <a:solidFill>
-                  <a:schemeClr val="tx1">
-                    <a:lumMod val="75000"/>
-                    <a:lumOff val="25000"/>
-                  </a:schemeClr>
-                </a:solidFill>
-              </a:rPr>
-              <a:t>flash </a:t>
-            </a:r>
-            <a:r>
-              <a:rPr lang="zh-CN" altLang="en-US" sz="1200" b="1" dirty="0">
-                <a:solidFill>
-                  <a:schemeClr val="tx1">
-                    <a:lumMod val="75000"/>
-                    <a:lumOff val="25000"/>
-                  </a:schemeClr>
-                </a:solidFill>
-              </a:rPr>
-              <a:t>里。</a:t>
-            </a:r>
-          </a:p>
-        </p:txBody>
-      </p:sp>
-    </p:spTree>
-    <p:extLst>
-      <p:ext uri="{BB962C8B-B14F-4D97-AF65-F5344CB8AC3E}">
-        <p14:creationId xmlns:p14="http://schemas.microsoft.com/office/powerpoint/2010/main" val="3530045677"/>
       </p:ext>
     </p:extLst>
   </p:cSld>

</xml_diff>